<commit_message>
Update doc templates for 2019
</commit_message>
<xml_diff>
--- a/doc/Quick Start architecture diagram.pptx
+++ b/doc/Quick Start architecture diagram.pptx
@@ -259,7 +259,7 @@
           <a:p>
             <a:fld id="{6244D3B9-4146-964F-9E7E-473F62F24AD4}" type="datetimeFigureOut">
               <a:rPr lang="en-US" smtClean="0"/>
-              <a:t>11/5/2018</a:t>
+              <a:t>1/1/2019</a:t>
             </a:fld>
             <a:endParaRPr lang="en-US"/>
           </a:p>
@@ -457,7 +457,7 @@
           <a:p>
             <a:fld id="{6244D3B9-4146-964F-9E7E-473F62F24AD4}" type="datetimeFigureOut">
               <a:rPr lang="en-US" smtClean="0"/>
-              <a:t>11/5/2018</a:t>
+              <a:t>1/1/2019</a:t>
             </a:fld>
             <a:endParaRPr lang="en-US"/>
           </a:p>
@@ -665,7 +665,7 @@
           <a:p>
             <a:fld id="{6244D3B9-4146-964F-9E7E-473F62F24AD4}" type="datetimeFigureOut">
               <a:rPr lang="en-US" smtClean="0"/>
-              <a:t>11/5/2018</a:t>
+              <a:t>1/1/2019</a:t>
             </a:fld>
             <a:endParaRPr lang="en-US"/>
           </a:p>
@@ -863,7 +863,7 @@
           <a:p>
             <a:fld id="{6244D3B9-4146-964F-9E7E-473F62F24AD4}" type="datetimeFigureOut">
               <a:rPr lang="en-US" smtClean="0"/>
-              <a:t>11/5/2018</a:t>
+              <a:t>1/1/2019</a:t>
             </a:fld>
             <a:endParaRPr lang="en-US"/>
           </a:p>
@@ -1138,7 +1138,7 @@
           <a:p>
             <a:fld id="{6244D3B9-4146-964F-9E7E-473F62F24AD4}" type="datetimeFigureOut">
               <a:rPr lang="en-US" smtClean="0"/>
-              <a:t>11/5/2018</a:t>
+              <a:t>1/1/2019</a:t>
             </a:fld>
             <a:endParaRPr lang="en-US"/>
           </a:p>
@@ -1403,7 +1403,7 @@
           <a:p>
             <a:fld id="{6244D3B9-4146-964F-9E7E-473F62F24AD4}" type="datetimeFigureOut">
               <a:rPr lang="en-US" smtClean="0"/>
-              <a:t>11/5/2018</a:t>
+              <a:t>1/1/2019</a:t>
             </a:fld>
             <a:endParaRPr lang="en-US"/>
           </a:p>
@@ -1815,7 +1815,7 @@
           <a:p>
             <a:fld id="{6244D3B9-4146-964F-9E7E-473F62F24AD4}" type="datetimeFigureOut">
               <a:rPr lang="en-US" smtClean="0"/>
-              <a:t>11/5/2018</a:t>
+              <a:t>1/1/2019</a:t>
             </a:fld>
             <a:endParaRPr lang="en-US"/>
           </a:p>
@@ -1956,7 +1956,7 @@
           <a:p>
             <a:fld id="{6244D3B9-4146-964F-9E7E-473F62F24AD4}" type="datetimeFigureOut">
               <a:rPr lang="en-US" smtClean="0"/>
-              <a:t>11/5/2018</a:t>
+              <a:t>1/1/2019</a:t>
             </a:fld>
             <a:endParaRPr lang="en-US"/>
           </a:p>
@@ -2069,7 +2069,7 @@
           <a:p>
             <a:fld id="{6244D3B9-4146-964F-9E7E-473F62F24AD4}" type="datetimeFigureOut">
               <a:rPr lang="en-US" smtClean="0"/>
-              <a:t>11/5/2018</a:t>
+              <a:t>1/1/2019</a:t>
             </a:fld>
             <a:endParaRPr lang="en-US"/>
           </a:p>
@@ -2380,7 +2380,7 @@
           <a:p>
             <a:fld id="{6244D3B9-4146-964F-9E7E-473F62F24AD4}" type="datetimeFigureOut">
               <a:rPr lang="en-US" smtClean="0"/>
-              <a:t>11/5/2018</a:t>
+              <a:t>1/1/2019</a:t>
             </a:fld>
             <a:endParaRPr lang="en-US"/>
           </a:p>
@@ -2668,7 +2668,7 @@
           <a:p>
             <a:fld id="{6244D3B9-4146-964F-9E7E-473F62F24AD4}" type="datetimeFigureOut">
               <a:rPr lang="en-US" smtClean="0"/>
-              <a:t>11/5/2018</a:t>
+              <a:t>1/1/2019</a:t>
             </a:fld>
             <a:endParaRPr lang="en-US"/>
           </a:p>
@@ -2909,7 +2909,7 @@
           <a:p>
             <a:fld id="{6244D3B9-4146-964F-9E7E-473F62F24AD4}" type="datetimeFigureOut">
               <a:rPr lang="en-US" smtClean="0"/>
-              <a:t>11/5/2018</a:t>
+              <a:t>1/1/2019</a:t>
             </a:fld>
             <a:endParaRPr lang="en-US"/>
           </a:p>
@@ -4356,13 +4356,14 @@
           </p:cNvPr>
           <p:cNvCxnSpPr>
             <a:cxnSpLocks/>
+            <a:stCxn id="49" idx="3"/>
           </p:cNvCxnSpPr>
           <p:nvPr/>
         </p:nvCxnSpPr>
         <p:spPr>
           <a:xfrm flipV="1">
-            <a:off x="4297527" y="4632698"/>
-            <a:ext cx="1426464" cy="3277"/>
+            <a:off x="4307255" y="4632698"/>
+            <a:ext cx="1373106" cy="0"/>
           </a:xfrm>
           <a:prstGeom prst="straightConnector1">
             <a:avLst/>
@@ -5035,7 +5036,7 @@
         </p:blipFill>
         <p:spPr>
           <a:xfrm>
-            <a:off x="2679191" y="1413927"/>
+            <a:off x="2679191" y="1423655"/>
             <a:ext cx="342900" cy="342900"/>
           </a:xfrm>
           <a:prstGeom prst="rect">
@@ -5071,7 +5072,7 @@
         </p:blipFill>
         <p:spPr>
           <a:xfrm>
-            <a:off x="6586558" y="1409013"/>
+            <a:off x="6586558" y="1418741"/>
             <a:ext cx="342900" cy="342900"/>
           </a:xfrm>
           <a:prstGeom prst="rect">
@@ -5179,7 +5180,7 @@
         </p:blipFill>
         <p:spPr>
           <a:xfrm>
-            <a:off x="2477692" y="596816"/>
+            <a:off x="2469379" y="598231"/>
             <a:ext cx="342900" cy="342900"/>
           </a:xfrm>
           <a:prstGeom prst="rect">
@@ -5215,7 +5216,7 @@
         </p:blipFill>
         <p:spPr>
           <a:xfrm>
-            <a:off x="6402291" y="595366"/>
+            <a:off x="6393978" y="596781"/>
             <a:ext cx="342900" cy="342900"/>
           </a:xfrm>
           <a:prstGeom prst="rect">
@@ -5251,7 +5252,7 @@
         </p:blipFill>
         <p:spPr>
           <a:xfrm>
-            <a:off x="2049666" y="1046332"/>
+            <a:off x="2049666" y="1038019"/>
             <a:ext cx="342900" cy="342900"/>
           </a:xfrm>
           <a:prstGeom prst="rect">
@@ -5287,7 +5288,7 @@
         </p:blipFill>
         <p:spPr>
           <a:xfrm>
-            <a:off x="1752614" y="240272"/>
+            <a:off x="1752614" y="242005"/>
             <a:ext cx="342900" cy="342900"/>
           </a:xfrm>
           <a:prstGeom prst="rect">
@@ -5331,11 +5332,6 @@
               </a:rPr>
               <a:t>10.0.128.0/20</a:t>
             </a:r>
-            <a:endParaRPr lang="en-US" sz="1100" dirty="0">
-              <a:solidFill>
-                <a:srgbClr val="545B64"/>
-              </a:solidFill>
-            </a:endParaRPr>
           </a:p>
         </p:txBody>
       </p:sp>
@@ -5375,11 +5371,6 @@
               </a:rPr>
               <a:t>10.0.144.0/20</a:t>
             </a:r>
-            <a:endParaRPr lang="en-US" sz="1100" dirty="0">
-              <a:solidFill>
-                <a:srgbClr val="545B64"/>
-              </a:solidFill>
-            </a:endParaRPr>
           </a:p>
         </p:txBody>
       </p:sp>
@@ -5463,11 +5454,6 @@
               </a:rPr>
               <a:t>10.0.32.0/19</a:t>
             </a:r>
-            <a:endParaRPr lang="en-US" sz="1100" dirty="0">
-              <a:solidFill>
-                <a:srgbClr val="545B64"/>
-              </a:solidFill>
-            </a:endParaRPr>
           </a:p>
         </p:txBody>
       </p:sp>

</xml_diff>

<commit_message>
Removed outlines around subnets
</commit_message>
<xml_diff>
--- a/doc/Quick Start architecture diagram.pptx
+++ b/doc/Quick Start architecture diagram.pptx
@@ -259,7 +259,7 @@
           <a:p>
             <a:fld id="{6244D3B9-4146-964F-9E7E-473F62F24AD4}" type="datetimeFigureOut">
               <a:rPr lang="en-US" smtClean="0"/>
-              <a:t>2/12/2019</a:t>
+              <a:t>5/15/20</a:t>
             </a:fld>
             <a:endParaRPr lang="en-US"/>
           </a:p>
@@ -457,7 +457,7 @@
           <a:p>
             <a:fld id="{6244D3B9-4146-964F-9E7E-473F62F24AD4}" type="datetimeFigureOut">
               <a:rPr lang="en-US" smtClean="0"/>
-              <a:t>2/12/2019</a:t>
+              <a:t>5/15/20</a:t>
             </a:fld>
             <a:endParaRPr lang="en-US"/>
           </a:p>
@@ -665,7 +665,7 @@
           <a:p>
             <a:fld id="{6244D3B9-4146-964F-9E7E-473F62F24AD4}" type="datetimeFigureOut">
               <a:rPr lang="en-US" smtClean="0"/>
-              <a:t>2/12/2019</a:t>
+              <a:t>5/15/20</a:t>
             </a:fld>
             <a:endParaRPr lang="en-US"/>
           </a:p>
@@ -863,7 +863,7 @@
           <a:p>
             <a:fld id="{6244D3B9-4146-964F-9E7E-473F62F24AD4}" type="datetimeFigureOut">
               <a:rPr lang="en-US" smtClean="0"/>
-              <a:t>2/12/2019</a:t>
+              <a:t>5/15/20</a:t>
             </a:fld>
             <a:endParaRPr lang="en-US"/>
           </a:p>
@@ -1138,7 +1138,7 @@
           <a:p>
             <a:fld id="{6244D3B9-4146-964F-9E7E-473F62F24AD4}" type="datetimeFigureOut">
               <a:rPr lang="en-US" smtClean="0"/>
-              <a:t>2/12/2019</a:t>
+              <a:t>5/15/20</a:t>
             </a:fld>
             <a:endParaRPr lang="en-US"/>
           </a:p>
@@ -1403,7 +1403,7 @@
           <a:p>
             <a:fld id="{6244D3B9-4146-964F-9E7E-473F62F24AD4}" type="datetimeFigureOut">
               <a:rPr lang="en-US" smtClean="0"/>
-              <a:t>2/12/2019</a:t>
+              <a:t>5/15/20</a:t>
             </a:fld>
             <a:endParaRPr lang="en-US"/>
           </a:p>
@@ -1815,7 +1815,7 @@
           <a:p>
             <a:fld id="{6244D3B9-4146-964F-9E7E-473F62F24AD4}" type="datetimeFigureOut">
               <a:rPr lang="en-US" smtClean="0"/>
-              <a:t>2/12/2019</a:t>
+              <a:t>5/15/20</a:t>
             </a:fld>
             <a:endParaRPr lang="en-US"/>
           </a:p>
@@ -1956,7 +1956,7 @@
           <a:p>
             <a:fld id="{6244D3B9-4146-964F-9E7E-473F62F24AD4}" type="datetimeFigureOut">
               <a:rPr lang="en-US" smtClean="0"/>
-              <a:t>2/12/2019</a:t>
+              <a:t>5/15/20</a:t>
             </a:fld>
             <a:endParaRPr lang="en-US"/>
           </a:p>
@@ -2069,7 +2069,7 @@
           <a:p>
             <a:fld id="{6244D3B9-4146-964F-9E7E-473F62F24AD4}" type="datetimeFigureOut">
               <a:rPr lang="en-US" smtClean="0"/>
-              <a:t>2/12/2019</a:t>
+              <a:t>5/15/20</a:t>
             </a:fld>
             <a:endParaRPr lang="en-US"/>
           </a:p>
@@ -2380,7 +2380,7 @@
           <a:p>
             <a:fld id="{6244D3B9-4146-964F-9E7E-473F62F24AD4}" type="datetimeFigureOut">
               <a:rPr lang="en-US" smtClean="0"/>
-              <a:t>2/12/2019</a:t>
+              <a:t>5/15/20</a:t>
             </a:fld>
             <a:endParaRPr lang="en-US"/>
           </a:p>
@@ -2668,7 +2668,7 @@
           <a:p>
             <a:fld id="{6244D3B9-4146-964F-9E7E-473F62F24AD4}" type="datetimeFigureOut">
               <a:rPr lang="en-US" smtClean="0"/>
-              <a:t>2/12/2019</a:t>
+              <a:t>5/15/20</a:t>
             </a:fld>
             <a:endParaRPr lang="en-US"/>
           </a:p>
@@ -2909,7 +2909,7 @@
           <a:p>
             <a:fld id="{6244D3B9-4146-964F-9E7E-473F62F24AD4}" type="datetimeFigureOut">
               <a:rPr lang="en-US" smtClean="0"/>
-              <a:t>2/12/2019</a:t>
+              <a:t>5/15/20</a:t>
             </a:fld>
             <a:endParaRPr lang="en-US"/>
           </a:p>
@@ -3352,9 +3352,7 @@
             </a:srgbClr>
           </a:solidFill>
           <a:ln w="12700">
-            <a:solidFill>
-              <a:srgbClr val="1E8900"/>
-            </a:solidFill>
+            <a:noFill/>
             <a:prstDash val="solid"/>
           </a:ln>
         </p:spPr>
@@ -3421,9 +3419,6 @@
                   </a14:imgLayer>
                 </a14:imgProps>
               </a:ext>
-              <a:ext uri="{96DAC541-7B7A-43D3-8B79-37D633B846F1}">
-                <asvg:svgBlip xmlns:asvg="http://schemas.microsoft.com/office/drawing/2016/SVG/main" xmlns="" r:embed="rId4"/>
-              </a:ext>
             </a:extLst>
           </a:blip>
           <a:stretch>
@@ -3505,9 +3500,7 @@
             </a:srgbClr>
           </a:solidFill>
           <a:ln w="12700">
-            <a:solidFill>
-              <a:srgbClr val="1E8900"/>
-            </a:solidFill>
+            <a:noFill/>
             <a:prstDash val="solid"/>
           </a:ln>
         </p:spPr>
@@ -3639,9 +3632,7 @@
             </a:srgbClr>
           </a:solidFill>
           <a:ln w="12700">
-            <a:solidFill>
-              <a:srgbClr val="007DBC"/>
-            </a:solidFill>
+            <a:noFill/>
             <a:prstDash val="solid"/>
           </a:ln>
         </p:spPr>
@@ -3826,10 +3817,10 @@
           <p:nvPr/>
         </p:nvPicPr>
         <p:blipFill>
-          <a:blip r:embed="rId5">
+          <a:blip r:embed="rId4">
             <a:extLst>
               <a:ext uri="{96DAC541-7B7A-43D3-8B79-37D633B846F1}">
-                <asvg:svgBlip xmlns:asvg="http://schemas.microsoft.com/office/drawing/2016/SVG/main" xmlns="" r:embed="rId6"/>
+                <asvg:svgBlip xmlns:asvg="http://schemas.microsoft.com/office/drawing/2016/SVG/main" r:embed="rId5"/>
               </a:ext>
             </a:extLst>
           </a:blip>
@@ -3862,10 +3853,10 @@
           <p:nvPr/>
         </p:nvPicPr>
         <p:blipFill>
-          <a:blip r:embed="rId7">
+          <a:blip r:embed="rId6">
             <a:extLst>
               <a:ext uri="{96DAC541-7B7A-43D3-8B79-37D633B846F1}">
-                <asvg:svgBlip xmlns:asvg="http://schemas.microsoft.com/office/drawing/2016/SVG/main" xmlns="" r:embed="rId8"/>
+                <asvg:svgBlip xmlns:asvg="http://schemas.microsoft.com/office/drawing/2016/SVG/main" r:embed="rId7"/>
               </a:ext>
             </a:extLst>
           </a:blip>
@@ -3898,10 +3889,10 @@
           <p:nvPr/>
         </p:nvPicPr>
         <p:blipFill>
-          <a:blip r:embed="rId9">
+          <a:blip r:embed="rId8">
             <a:extLst>
               <a:ext uri="{96DAC541-7B7A-43D3-8B79-37D633B846F1}">
-                <asvg:svgBlip xmlns:asvg="http://schemas.microsoft.com/office/drawing/2016/SVG/main" xmlns="" r:embed="rId10"/>
+                <asvg:svgBlip xmlns:asvg="http://schemas.microsoft.com/office/drawing/2016/SVG/main" r:embed="rId9"/>
               </a:ext>
             </a:extLst>
           </a:blip>
@@ -3934,10 +3925,10 @@
           <p:nvPr/>
         </p:nvPicPr>
         <p:blipFill>
-          <a:blip r:embed="rId11">
+          <a:blip r:embed="rId10">
             <a:extLst>
               <a:ext uri="{96DAC541-7B7A-43D3-8B79-37D633B846F1}">
-                <asvg:svgBlip xmlns:asvg="http://schemas.microsoft.com/office/drawing/2016/SVG/main" xmlns="" r:embed="rId12"/>
+                <asvg:svgBlip xmlns:asvg="http://schemas.microsoft.com/office/drawing/2016/SVG/main" r:embed="rId11"/>
               </a:ext>
             </a:extLst>
           </a:blip>
@@ -3970,10 +3961,10 @@
           <p:nvPr/>
         </p:nvPicPr>
         <p:blipFill>
-          <a:blip r:embed="rId13">
+          <a:blip r:embed="rId12">
             <a:extLst>
               <a:ext uri="{96DAC541-7B7A-43D3-8B79-37D633B846F1}">
-                <asvg:svgBlip xmlns:asvg="http://schemas.microsoft.com/office/drawing/2016/SVG/main" xmlns="" r:embed="rId14"/>
+                <asvg:svgBlip xmlns:asvg="http://schemas.microsoft.com/office/drawing/2016/SVG/main" r:embed="rId13"/>
               </a:ext>
             </a:extLst>
           </a:blip>
@@ -4042,10 +4033,10 @@
           <p:nvPr/>
         </p:nvPicPr>
         <p:blipFill>
-          <a:blip r:embed="rId15">
+          <a:blip r:embed="rId14">
             <a:extLst>
               <a:ext uri="{96DAC541-7B7A-43D3-8B79-37D633B846F1}">
-                <asvg:svgBlip xmlns:asvg="http://schemas.microsoft.com/office/drawing/2016/SVG/main" xmlns="" r:embed="rId16"/>
+                <asvg:svgBlip xmlns:asvg="http://schemas.microsoft.com/office/drawing/2016/SVG/main" r:embed="rId15"/>
               </a:ext>
             </a:extLst>
           </a:blip>
@@ -4078,10 +4069,10 @@
           <p:nvPr/>
         </p:nvPicPr>
         <p:blipFill>
-          <a:blip r:embed="rId17">
+          <a:blip r:embed="rId16">
             <a:extLst>
               <a:ext uri="{96DAC541-7B7A-43D3-8B79-37D633B846F1}">
-                <asvg:svgBlip xmlns:asvg="http://schemas.microsoft.com/office/drawing/2016/SVG/main" xmlns="" r:embed="rId4"/>
+                <asvg:svgBlip xmlns:asvg="http://schemas.microsoft.com/office/drawing/2016/SVG/main" r:embed="rId17"/>
               </a:ext>
             </a:extLst>
           </a:blip>
@@ -4117,7 +4108,7 @@
           <a:blip r:embed="rId18">
             <a:extLst>
               <a:ext uri="{96DAC541-7B7A-43D3-8B79-37D633B846F1}">
-                <asvg:svgBlip xmlns:asvg="http://schemas.microsoft.com/office/drawing/2016/SVG/main" xmlns="" r:embed="rId19"/>
+                <asvg:svgBlip xmlns:asvg="http://schemas.microsoft.com/office/drawing/2016/SVG/main" r:embed="rId19"/>
               </a:ext>
             </a:extLst>
           </a:blip>
@@ -4225,7 +4216,7 @@
           <a:blip r:embed="rId20">
             <a:extLst>
               <a:ext uri="{96DAC541-7B7A-43D3-8B79-37D633B846F1}">
-                <asvg:svgBlip xmlns:asvg="http://schemas.microsoft.com/office/drawing/2016/SVG/main" xmlns="" r:embed="rId21"/>
+                <asvg:svgBlip xmlns:asvg="http://schemas.microsoft.com/office/drawing/2016/SVG/main" r:embed="rId21"/>
               </a:ext>
             </a:extLst>
           </a:blip>
@@ -4333,7 +4324,7 @@
           <a:blip r:embed="rId22">
             <a:extLst>
               <a:ext uri="{96DAC541-7B7A-43D3-8B79-37D633B846F1}">
-                <asvg:svgBlip xmlns:asvg="http://schemas.microsoft.com/office/drawing/2016/SVG/main" xmlns="" r:embed="rId23"/>
+                <asvg:svgBlip xmlns:asvg="http://schemas.microsoft.com/office/drawing/2016/SVG/main" r:embed="rId23"/>
               </a:ext>
             </a:extLst>
           </a:blip>
@@ -4405,7 +4396,7 @@
           <a:blip r:embed="rId24">
             <a:extLst>
               <a:ext uri="{96DAC541-7B7A-43D3-8B79-37D633B846F1}">
-                <asvg:svgBlip xmlns:asvg="http://schemas.microsoft.com/office/drawing/2016/SVG/main" xmlns="" r:embed="rId25"/>
+                <asvg:svgBlip xmlns:asvg="http://schemas.microsoft.com/office/drawing/2016/SVG/main" r:embed="rId25"/>
               </a:ext>
             </a:extLst>
           </a:blip>
@@ -4529,9 +4520,7 @@
             </a:srgbClr>
           </a:solidFill>
           <a:ln w="12700">
-            <a:solidFill>
-              <a:srgbClr val="007DBC"/>
-            </a:solidFill>
+            <a:noFill/>
             <a:prstDash val="solid"/>
           </a:ln>
         </p:spPr>
@@ -4652,10 +4641,10 @@
           <p:nvPr/>
         </p:nvPicPr>
         <p:blipFill>
-          <a:blip r:embed="rId11">
+          <a:blip r:embed="rId10">
             <a:extLst>
               <a:ext uri="{96DAC541-7B7A-43D3-8B79-37D633B846F1}">
-                <asvg:svgBlip xmlns:asvg="http://schemas.microsoft.com/office/drawing/2016/SVG/main" xmlns="" r:embed="rId12"/>
+                <asvg:svgBlip xmlns:asvg="http://schemas.microsoft.com/office/drawing/2016/SVG/main" r:embed="rId11"/>
               </a:ext>
             </a:extLst>
           </a:blip>
@@ -4688,10 +4677,10 @@
           <p:nvPr/>
         </p:nvPicPr>
         <p:blipFill>
-          <a:blip r:embed="rId13">
+          <a:blip r:embed="rId12">
             <a:extLst>
               <a:ext uri="{96DAC541-7B7A-43D3-8B79-37D633B846F1}">
-                <asvg:svgBlip xmlns:asvg="http://schemas.microsoft.com/office/drawing/2016/SVG/main" xmlns="" r:embed="rId14"/>
+                <asvg:svgBlip xmlns:asvg="http://schemas.microsoft.com/office/drawing/2016/SVG/main" r:embed="rId13"/>
               </a:ext>
             </a:extLst>
           </a:blip>
@@ -4760,10 +4749,10 @@
           <p:nvPr/>
         </p:nvPicPr>
         <p:blipFill>
-          <a:blip r:embed="rId15">
+          <a:blip r:embed="rId14">
             <a:extLst>
               <a:ext uri="{96DAC541-7B7A-43D3-8B79-37D633B846F1}">
-                <asvg:svgBlip xmlns:asvg="http://schemas.microsoft.com/office/drawing/2016/SVG/main" xmlns="" r:embed="rId16"/>
+                <asvg:svgBlip xmlns:asvg="http://schemas.microsoft.com/office/drawing/2016/SVG/main" r:embed="rId15"/>
               </a:ext>
             </a:extLst>
           </a:blip>
@@ -4799,7 +4788,7 @@
           <a:blip r:embed="rId18">
             <a:extLst>
               <a:ext uri="{96DAC541-7B7A-43D3-8B79-37D633B846F1}">
-                <asvg:svgBlip xmlns:asvg="http://schemas.microsoft.com/office/drawing/2016/SVG/main" xmlns="" r:embed="rId19"/>
+                <asvg:svgBlip xmlns:asvg="http://schemas.microsoft.com/office/drawing/2016/SVG/main" r:embed="rId19"/>
               </a:ext>
             </a:extLst>
           </a:blip>

</xml_diff>

<commit_message>
Update Quick Start architecture diagram.pptx
Changed fonts to Arial: 12 pt in groups, 14 pt for service icons
</commit_message>
<xml_diff>
--- a/doc/Quick Start architecture diagram.pptx
+++ b/doc/Quick Start architecture diagram.pptx
@@ -259,7 +259,7 @@
           <a:p>
             <a:fld id="{6244D3B9-4146-964F-9E7E-473F62F24AD4}" type="datetimeFigureOut">
               <a:rPr lang="en-US" smtClean="0"/>
-              <a:t>5/15/20</a:t>
+              <a:t>5/29/20</a:t>
             </a:fld>
             <a:endParaRPr lang="en-US"/>
           </a:p>
@@ -457,7 +457,7 @@
           <a:p>
             <a:fld id="{6244D3B9-4146-964F-9E7E-473F62F24AD4}" type="datetimeFigureOut">
               <a:rPr lang="en-US" smtClean="0"/>
-              <a:t>5/15/20</a:t>
+              <a:t>5/29/20</a:t>
             </a:fld>
             <a:endParaRPr lang="en-US"/>
           </a:p>
@@ -665,7 +665,7 @@
           <a:p>
             <a:fld id="{6244D3B9-4146-964F-9E7E-473F62F24AD4}" type="datetimeFigureOut">
               <a:rPr lang="en-US" smtClean="0"/>
-              <a:t>5/15/20</a:t>
+              <a:t>5/29/20</a:t>
             </a:fld>
             <a:endParaRPr lang="en-US"/>
           </a:p>
@@ -863,7 +863,7 @@
           <a:p>
             <a:fld id="{6244D3B9-4146-964F-9E7E-473F62F24AD4}" type="datetimeFigureOut">
               <a:rPr lang="en-US" smtClean="0"/>
-              <a:t>5/15/20</a:t>
+              <a:t>5/29/20</a:t>
             </a:fld>
             <a:endParaRPr lang="en-US"/>
           </a:p>
@@ -1138,7 +1138,7 @@
           <a:p>
             <a:fld id="{6244D3B9-4146-964F-9E7E-473F62F24AD4}" type="datetimeFigureOut">
               <a:rPr lang="en-US" smtClean="0"/>
-              <a:t>5/15/20</a:t>
+              <a:t>5/29/20</a:t>
             </a:fld>
             <a:endParaRPr lang="en-US"/>
           </a:p>
@@ -1403,7 +1403,7 @@
           <a:p>
             <a:fld id="{6244D3B9-4146-964F-9E7E-473F62F24AD4}" type="datetimeFigureOut">
               <a:rPr lang="en-US" smtClean="0"/>
-              <a:t>5/15/20</a:t>
+              <a:t>5/29/20</a:t>
             </a:fld>
             <a:endParaRPr lang="en-US"/>
           </a:p>
@@ -1815,7 +1815,7 @@
           <a:p>
             <a:fld id="{6244D3B9-4146-964F-9E7E-473F62F24AD4}" type="datetimeFigureOut">
               <a:rPr lang="en-US" smtClean="0"/>
-              <a:t>5/15/20</a:t>
+              <a:t>5/29/20</a:t>
             </a:fld>
             <a:endParaRPr lang="en-US"/>
           </a:p>
@@ -1956,7 +1956,7 @@
           <a:p>
             <a:fld id="{6244D3B9-4146-964F-9E7E-473F62F24AD4}" type="datetimeFigureOut">
               <a:rPr lang="en-US" smtClean="0"/>
-              <a:t>5/15/20</a:t>
+              <a:t>5/29/20</a:t>
             </a:fld>
             <a:endParaRPr lang="en-US"/>
           </a:p>
@@ -2069,7 +2069,7 @@
           <a:p>
             <a:fld id="{6244D3B9-4146-964F-9E7E-473F62F24AD4}" type="datetimeFigureOut">
               <a:rPr lang="en-US" smtClean="0"/>
-              <a:t>5/15/20</a:t>
+              <a:t>5/29/20</a:t>
             </a:fld>
             <a:endParaRPr lang="en-US"/>
           </a:p>
@@ -2380,7 +2380,7 @@
           <a:p>
             <a:fld id="{6244D3B9-4146-964F-9E7E-473F62F24AD4}" type="datetimeFigureOut">
               <a:rPr lang="en-US" smtClean="0"/>
-              <a:t>5/15/20</a:t>
+              <a:t>5/29/20</a:t>
             </a:fld>
             <a:endParaRPr lang="en-US"/>
           </a:p>
@@ -2668,7 +2668,7 @@
           <a:p>
             <a:fld id="{6244D3B9-4146-964F-9E7E-473F62F24AD4}" type="datetimeFigureOut">
               <a:rPr lang="en-US" smtClean="0"/>
-              <a:t>5/15/20</a:t>
+              <a:t>5/29/20</a:t>
             </a:fld>
             <a:endParaRPr lang="en-US"/>
           </a:p>
@@ -2909,7 +2909,7 @@
           <a:p>
             <a:fld id="{6244D3B9-4146-964F-9E7E-473F62F24AD4}" type="datetimeFigureOut">
               <a:rPr lang="en-US" smtClean="0"/>
-              <a:t>5/15/20</a:t>
+              <a:t>5/29/20</a:t>
             </a:fld>
             <a:endParaRPr lang="en-US"/>
           </a:p>
@@ -3387,6 +3387,8 @@
                 <a:solidFill>
                   <a:srgbClr val="1E8900"/>
                 </a:solidFill>
+                <a:latin typeface="Arial" panose="020B0604020202020204" pitchFamily="34" charset="0"/>
+                <a:cs typeface="Arial" panose="020B0604020202020204" pitchFamily="34" charset="0"/>
               </a:rPr>
               <a:t>Public subnet</a:t>
             </a:r>
@@ -3452,8 +3454,8 @@
         </p:nvSpPr>
         <p:spPr>
           <a:xfrm>
-            <a:off x="6435103" y="2580352"/>
-            <a:ext cx="973105" cy="276999"/>
+            <a:off x="6367868" y="2570562"/>
+            <a:ext cx="1116578" cy="276999"/>
           </a:xfrm>
           <a:prstGeom prst="rect">
             <a:avLst/>
@@ -3461,14 +3463,17 @@
           <a:noFill/>
         </p:spPr>
         <p:txBody>
-          <a:bodyPr wrap="square" rtlCol="0">
+          <a:bodyPr wrap="square" rtlCol="0" anchor="t">
             <a:spAutoFit/>
           </a:bodyPr>
           <a:lstStyle/>
           <a:p>
             <a:pPr algn="ctr"/>
             <a:r>
-              <a:rPr lang="en-US" sz="1200" dirty="0"/>
+              <a:rPr lang="en-US" sz="1200" dirty="0">
+                <a:latin typeface="Arial" panose="020B0604020202020204" pitchFamily="34" charset="0"/>
+                <a:cs typeface="Arial" panose="020B0604020202020204" pitchFamily="34" charset="0"/>
+              </a:rPr>
               <a:t>Bastion host</a:t>
             </a:r>
           </a:p>
@@ -3535,6 +3540,8 @@
                 <a:solidFill>
                   <a:srgbClr val="1E8900"/>
                 </a:solidFill>
+                <a:latin typeface="Arial" panose="020B0604020202020204" pitchFamily="34" charset="0"/>
+                <a:cs typeface="Arial" panose="020B0604020202020204" pitchFamily="34" charset="0"/>
               </a:rPr>
               <a:t>Public subnet</a:t>
             </a:r>
@@ -3600,6 +3607,8 @@
                 <a:solidFill>
                   <a:srgbClr val="1E8900"/>
                 </a:solidFill>
+                <a:latin typeface="Arial" panose="020B0604020202020204" pitchFamily="34" charset="0"/>
+                <a:cs typeface="Arial" panose="020B0604020202020204" pitchFamily="34" charset="0"/>
               </a:rPr>
               <a:t>VPC</a:t>
             </a:r>
@@ -3667,6 +3676,8 @@
                 <a:solidFill>
                   <a:srgbClr val="007DBC"/>
                 </a:solidFill>
+                <a:latin typeface="Arial" panose="020B0604020202020204" pitchFamily="34" charset="0"/>
+                <a:cs typeface="Arial" panose="020B0604020202020204" pitchFamily="34" charset="0"/>
               </a:rPr>
               <a:t>Private subnet</a:t>
             </a:r>
@@ -3731,6 +3742,8 @@
                 <a:solidFill>
                   <a:sysClr val="windowText" lastClr="000000"/>
                 </a:solidFill>
+                <a:latin typeface="Arial" panose="020B0604020202020204" pitchFamily="34" charset="0"/>
+                <a:cs typeface="Arial" panose="020B0604020202020204" pitchFamily="34" charset="0"/>
               </a:rPr>
               <a:t>AWS Cloud</a:t>
             </a:r>
@@ -3751,7 +3764,7 @@
         </p:nvSpPr>
         <p:spPr>
           <a:xfrm>
-            <a:off x="1876371" y="619972"/>
+            <a:off x="1862924" y="619972"/>
             <a:ext cx="2782099" cy="5849653"/>
           </a:xfrm>
           <a:prstGeom prst="rect">
@@ -3796,6 +3809,8 @@
                 <a:solidFill>
                   <a:srgbClr val="007DBC"/>
                 </a:solidFill>
+                <a:latin typeface="Arial" panose="020B0604020202020204" pitchFamily="34" charset="0"/>
+                <a:cs typeface="Arial" panose="020B0604020202020204" pitchFamily="34" charset="0"/>
               </a:rPr>
               <a:t>Availability Zone 1</a:t>
             </a:r>
@@ -3996,8 +4011,8 @@
         </p:nvSpPr>
         <p:spPr>
           <a:xfrm>
-            <a:off x="2109829" y="2591084"/>
-            <a:ext cx="994971" cy="276999"/>
+            <a:off x="2018858" y="2570562"/>
+            <a:ext cx="1153178" cy="276999"/>
           </a:xfrm>
           <a:prstGeom prst="rect">
             <a:avLst/>
@@ -4005,14 +4020,17 @@
           <a:noFill/>
         </p:spPr>
         <p:txBody>
-          <a:bodyPr wrap="square" rtlCol="0">
+          <a:bodyPr wrap="square" rtlCol="0" anchor="t">
             <a:spAutoFit/>
           </a:bodyPr>
           <a:lstStyle/>
           <a:p>
             <a:pPr algn="ctr"/>
             <a:r>
-              <a:rPr lang="en-US" sz="1200" dirty="0"/>
+              <a:rPr lang="en-US" sz="1200" dirty="0">
+                <a:latin typeface="Arial" panose="020B0604020202020204" pitchFamily="34" charset="0"/>
+                <a:cs typeface="Arial" panose="020B0604020202020204" pitchFamily="34" charset="0"/>
+              </a:rPr>
               <a:t>NAT gateway</a:t>
             </a:r>
           </a:p>
@@ -4156,7 +4174,10 @@
           <a:p>
             <a:pPr algn="ctr"/>
             <a:r>
-              <a:rPr lang="en-US" sz="1200" dirty="0"/>
+              <a:rPr lang="en-US" sz="1200" dirty="0">
+                <a:latin typeface="Arial" panose="020B0604020202020204" pitchFamily="34" charset="0"/>
+                <a:cs typeface="Arial" panose="020B0604020202020204" pitchFamily="34" charset="0"/>
+              </a:rPr>
               <a:t>&lt;Your product instances&gt;</a:t>
             </a:r>
           </a:p>
@@ -4176,8 +4197,8 @@
         </p:nvSpPr>
         <p:spPr>
           <a:xfrm>
-            <a:off x="3309258" y="2570562"/>
-            <a:ext cx="973105" cy="276999"/>
+            <a:off x="3228576" y="2570562"/>
+            <a:ext cx="1132415" cy="276999"/>
           </a:xfrm>
           <a:prstGeom prst="rect">
             <a:avLst/>
@@ -4185,14 +4206,17 @@
           <a:noFill/>
         </p:spPr>
         <p:txBody>
-          <a:bodyPr wrap="square" rtlCol="0">
+          <a:bodyPr wrap="square" rtlCol="0" anchor="t">
             <a:spAutoFit/>
           </a:bodyPr>
           <a:lstStyle/>
           <a:p>
             <a:pPr algn="ctr"/>
             <a:r>
-              <a:rPr lang="en-US" sz="1200" dirty="0"/>
+              <a:rPr lang="en-US" sz="1200" dirty="0">
+                <a:latin typeface="Arial" panose="020B0604020202020204" pitchFamily="34" charset="0"/>
+                <a:cs typeface="Arial" panose="020B0604020202020204" pitchFamily="34" charset="0"/>
+              </a:rPr>
               <a:t>Bastion host</a:t>
             </a:r>
           </a:p>
@@ -4249,7 +4273,7 @@
         <p:spPr>
           <a:xfrm>
             <a:off x="9202994" y="3467302"/>
-            <a:ext cx="1651819" cy="276999"/>
+            <a:ext cx="1651819" cy="307777"/>
           </a:xfrm>
           <a:prstGeom prst="rect">
             <a:avLst/>
@@ -4264,7 +4288,10 @@
           <a:p>
             <a:pPr algn="ctr"/>
             <a:r>
-              <a:rPr lang="en-US" sz="1200" dirty="0"/>
+              <a:rPr lang="en-US" sz="1400" dirty="0">
+                <a:latin typeface="Arial" panose="020B0604020202020204" pitchFamily="34" charset="0"/>
+                <a:cs typeface="Arial" panose="020B0604020202020204" pitchFamily="34" charset="0"/>
+              </a:rPr>
               <a:t>Amazon S3</a:t>
             </a:r>
           </a:p>
@@ -4285,7 +4312,7 @@
         <p:spPr>
           <a:xfrm>
             <a:off x="9202994" y="4954116"/>
-            <a:ext cx="1651819" cy="276999"/>
+            <a:ext cx="1651819" cy="307777"/>
           </a:xfrm>
           <a:prstGeom prst="rect">
             <a:avLst/>
@@ -4300,7 +4327,10 @@
           <a:p>
             <a:pPr algn="ctr"/>
             <a:r>
-              <a:rPr lang="en-US" sz="1200" dirty="0"/>
+              <a:rPr lang="en-US" sz="1400" dirty="0">
+                <a:latin typeface="Arial" panose="020B0604020202020204" pitchFamily="34" charset="0"/>
+                <a:cs typeface="Arial" panose="020B0604020202020204" pitchFamily="34" charset="0"/>
+              </a:rPr>
               <a:t>Amazon Route 53</a:t>
             </a:r>
           </a:p>
@@ -4356,8 +4386,8 @@
         </p:nvSpPr>
         <p:spPr>
           <a:xfrm>
-            <a:off x="4786108" y="4961997"/>
-            <a:ext cx="1194005" cy="461665"/>
+            <a:off x="4698812" y="4961997"/>
+            <a:ext cx="1335090" cy="461665"/>
           </a:xfrm>
           <a:prstGeom prst="rect">
             <a:avLst/>
@@ -4372,7 +4402,10 @@
           <a:p>
             <a:pPr algn="ctr"/>
             <a:r>
-              <a:rPr lang="en-US" sz="1200" dirty="0"/>
+              <a:rPr lang="en-US" sz="1200" dirty="0">
+                <a:latin typeface="Arial" panose="020B0604020202020204" pitchFamily="34" charset="0"/>
+                <a:cs typeface="Arial" panose="020B0604020202020204" pitchFamily="34" charset="0"/>
+              </a:rPr>
               <a:t>Elastic Load Balancing (ELB)</a:t>
             </a:r>
           </a:p>
@@ -4448,6 +4481,8 @@
                 <a:solidFill>
                   <a:srgbClr val="1E8900"/>
                 </a:solidFill>
+                <a:latin typeface="Arial" panose="020B0604020202020204" pitchFamily="34" charset="0"/>
+                <a:cs typeface="Arial" panose="020B0604020202020204" pitchFamily="34" charset="0"/>
               </a:rPr>
               <a:t>10.0.128.0/20</a:t>
             </a:r>
@@ -4488,6 +4523,8 @@
                 <a:solidFill>
                   <a:srgbClr val="007DBC"/>
                 </a:solidFill>
+                <a:latin typeface="Arial" panose="020B0604020202020204" pitchFamily="34" charset="0"/>
+                <a:cs typeface="Arial" panose="020B0604020202020204" pitchFamily="34" charset="0"/>
               </a:rPr>
               <a:t>10.0.0.0/19</a:t>
             </a:r>
@@ -4555,6 +4592,8 @@
                 <a:solidFill>
                   <a:srgbClr val="007DBC"/>
                 </a:solidFill>
+                <a:latin typeface="Arial" panose="020B0604020202020204" pitchFamily="34" charset="0"/>
+                <a:cs typeface="Arial" panose="020B0604020202020204" pitchFamily="34" charset="0"/>
               </a:rPr>
               <a:t>Private subnet</a:t>
             </a:r>
@@ -4575,7 +4614,7 @@
         </p:nvSpPr>
         <p:spPr>
           <a:xfrm>
-            <a:off x="6093492" y="629762"/>
+            <a:off x="6080045" y="629762"/>
             <a:ext cx="2782099" cy="5849653"/>
           </a:xfrm>
           <a:prstGeom prst="rect">
@@ -4620,6 +4659,8 @@
                 <a:solidFill>
                   <a:srgbClr val="007DBC"/>
                 </a:solidFill>
+                <a:latin typeface="Arial" panose="020B0604020202020204" pitchFamily="34" charset="0"/>
+                <a:cs typeface="Arial" panose="020B0604020202020204" pitchFamily="34" charset="0"/>
               </a:rPr>
               <a:t>Availability Zone 2</a:t>
             </a:r>
@@ -4712,8 +4753,8 @@
         </p:nvSpPr>
         <p:spPr>
           <a:xfrm>
-            <a:off x="7648700" y="2600874"/>
-            <a:ext cx="994971" cy="276999"/>
+            <a:off x="7565128" y="2570562"/>
+            <a:ext cx="1159225" cy="276999"/>
           </a:xfrm>
           <a:prstGeom prst="rect">
             <a:avLst/>
@@ -4721,14 +4762,17 @@
           <a:noFill/>
         </p:spPr>
         <p:txBody>
-          <a:bodyPr wrap="square" rtlCol="0">
+          <a:bodyPr wrap="square" rtlCol="0" anchor="t">
             <a:spAutoFit/>
           </a:bodyPr>
           <a:lstStyle/>
           <a:p>
             <a:pPr algn="ctr"/>
             <a:r>
-              <a:rPr lang="en-US" sz="1200" dirty="0"/>
+              <a:rPr lang="en-US" sz="1200" dirty="0">
+                <a:latin typeface="Arial" panose="020B0604020202020204" pitchFamily="34" charset="0"/>
+                <a:cs typeface="Arial" panose="020B0604020202020204" pitchFamily="34" charset="0"/>
+              </a:rPr>
               <a:t>NAT gateway</a:t>
             </a:r>
           </a:p>
@@ -4836,7 +4880,10 @@
           <a:p>
             <a:pPr algn="ctr"/>
             <a:r>
-              <a:rPr lang="en-US" sz="1200" dirty="0"/>
+              <a:rPr lang="en-US" sz="1200" dirty="0">
+                <a:latin typeface="Arial" panose="020B0604020202020204" pitchFamily="34" charset="0"/>
+                <a:cs typeface="Arial" panose="020B0604020202020204" pitchFamily="34" charset="0"/>
+              </a:rPr>
               <a:t>&lt;Your product instances&gt;</a:t>
             </a:r>
           </a:p>
@@ -4876,6 +4923,8 @@
                 <a:solidFill>
                   <a:srgbClr val="1E8900"/>
                 </a:solidFill>
+                <a:latin typeface="Arial" panose="020B0604020202020204" pitchFamily="34" charset="0"/>
+                <a:cs typeface="Arial" panose="020B0604020202020204" pitchFamily="34" charset="0"/>
               </a:rPr>
               <a:t>10.0.144.0/20</a:t>
             </a:r>
@@ -4916,6 +4965,8 @@
                 <a:solidFill>
                   <a:srgbClr val="007DBC"/>
                 </a:solidFill>
+                <a:latin typeface="Arial" panose="020B0604020202020204" pitchFamily="34" charset="0"/>
+                <a:cs typeface="Arial" panose="020B0604020202020204" pitchFamily="34" charset="0"/>
               </a:rPr>
               <a:t>10.0.32.0/19</a:t>
             </a:r>
@@ -5048,6 +5099,8 @@
                 <a:solidFill>
                   <a:srgbClr val="1E8900"/>
                 </a:solidFill>
+                <a:latin typeface="Arial" panose="020B0604020202020204" pitchFamily="34" charset="0"/>
+                <a:cs typeface="Arial" panose="020B0604020202020204" pitchFamily="34" charset="0"/>
               </a:rPr>
               <a:t>10.0.0.0/16</a:t>
             </a:r>
@@ -5123,12 +5176,18 @@
             </a:endParaRPr>
           </a:p>
           <a:p>
-            <a:pPr algn="ctr"/>
+            <a:pPr algn="ctr">
+              <a:tabLst>
+                <a:tab pos="3475038" algn="l"/>
+              </a:tabLst>
+            </a:pPr>
             <a:r>
               <a:rPr lang="en-US" sz="1200" dirty="0">
                 <a:solidFill>
                   <a:srgbClr val="D86613"/>
                 </a:solidFill>
+                <a:latin typeface="Arial" panose="020B0604020202020204" pitchFamily="34" charset="0"/>
+                <a:cs typeface="Arial" panose="020B0604020202020204" pitchFamily="34" charset="0"/>
               </a:rPr>
               <a:t>Auto Scaling group</a:t>
             </a:r>

</xml_diff>

<commit_message>
Removed CIDR numbers from architec diagram
</commit_message>
<xml_diff>
--- a/doc/Quick Start architecture diagram.pptx
+++ b/doc/Quick Start architecture diagram.pptx
@@ -223,7 +223,7 @@
           <a:p>
             <a:fld id="{49A7721D-1176-A640-AC48-B82F78C92D56}" type="datetimeFigureOut">
               <a:rPr lang="en-US" smtClean="0"/>
-              <a:t>6/3/20</a:t>
+              <a:t>8/17/20</a:t>
             </a:fld>
             <a:endParaRPr lang="en-US" dirty="0"/>
           </a:p>
@@ -400,7 +400,7 @@
           <a:p>
             <a:fld id="{C884A089-FB25-6D46-9D21-F0F04A18BCA8}" type="datetimeFigureOut">
               <a:rPr lang="en-US" smtClean="0"/>
-              <a:t>6/3/20</a:t>
+              <a:t>8/17/20</a:t>
             </a:fld>
             <a:endParaRPr lang="en-US" dirty="0"/>
           </a:p>
@@ -1099,7 +1099,7 @@
         <p:spPr>
           <a:xfrm>
             <a:off x="5682206" y="1563311"/>
-            <a:ext cx="2474928" cy="2065388"/>
+            <a:ext cx="2474928" cy="1787440"/>
           </a:xfrm>
           <a:prstGeom prst="rect">
             <a:avLst/>
@@ -1252,7 +1252,7 @@
         <p:spPr>
           <a:xfrm>
             <a:off x="1465085" y="1553521"/>
-            <a:ext cx="2474928" cy="2065388"/>
+            <a:ext cx="2474928" cy="1797230"/>
           </a:xfrm>
           <a:prstGeom prst="rect">
             <a:avLst/>
@@ -1321,7 +1321,7 @@
         <p:spPr>
           <a:xfrm>
             <a:off x="898444" y="1195189"/>
-            <a:ext cx="7741839" cy="5266272"/>
+            <a:ext cx="7741839" cy="4075311"/>
           </a:xfrm>
           <a:prstGeom prst="rect">
             <a:avLst/>
@@ -1387,8 +1387,8 @@
         </p:nvSpPr>
         <p:spPr>
           <a:xfrm>
-            <a:off x="1467065" y="3895908"/>
-            <a:ext cx="2470969" cy="2414536"/>
+            <a:off x="1467065" y="3639810"/>
+            <a:ext cx="2470969" cy="1520867"/>
           </a:xfrm>
           <a:prstGeom prst="rect">
             <a:avLst/>
@@ -1457,7 +1457,7 @@
         <p:spPr>
           <a:xfrm>
             <a:off x="706503" y="341189"/>
-            <a:ext cx="9585599" cy="6474232"/>
+            <a:ext cx="9585599" cy="5157911"/>
           </a:xfrm>
           <a:prstGeom prst="rect">
             <a:avLst/>
@@ -1522,8 +1522,8 @@
         </p:nvSpPr>
         <p:spPr>
           <a:xfrm>
-            <a:off x="1300213" y="788788"/>
-            <a:ext cx="2782099" cy="5849653"/>
+            <a:off x="1300213" y="788789"/>
+            <a:ext cx="2782099" cy="4596012"/>
           </a:xfrm>
           <a:prstGeom prst="rect">
             <a:avLst/>
@@ -1747,7 +1747,7 @@
         </p:blipFill>
         <p:spPr>
           <a:xfrm>
-            <a:off x="1468789" y="3893549"/>
+            <a:off x="1468789" y="3648856"/>
             <a:ext cx="274320" cy="274320"/>
           </a:xfrm>
           <a:prstGeom prst="rect">
@@ -1894,7 +1894,7 @@
         </p:blipFill>
         <p:spPr>
           <a:xfrm>
-            <a:off x="2444738" y="4572916"/>
+            <a:off x="2444738" y="4141116"/>
             <a:ext cx="469900" cy="469900"/>
           </a:xfrm>
           <a:prstGeom prst="rect">
@@ -1916,7 +1916,7 @@
         </p:nvSpPr>
         <p:spPr>
           <a:xfrm>
-            <a:off x="1923035" y="5069549"/>
+            <a:off x="1923035" y="4637749"/>
             <a:ext cx="1513305" cy="461665"/>
           </a:xfrm>
           <a:prstGeom prst="rect">
@@ -2008,7 +2008,7 @@
         </p:blipFill>
         <p:spPr>
           <a:xfrm>
-            <a:off x="9180861" y="3053810"/>
+            <a:off x="9180861" y="2812510"/>
             <a:ext cx="591034" cy="591034"/>
           </a:xfrm>
           <a:prstGeom prst="rect">
@@ -2030,7 +2030,7 @@
         </p:nvSpPr>
         <p:spPr>
           <a:xfrm>
-            <a:off x="8640283" y="3636118"/>
+            <a:off x="8640283" y="3394818"/>
             <a:ext cx="1651819" cy="307777"/>
           </a:xfrm>
           <a:prstGeom prst="rect">
@@ -2069,7 +2069,7 @@
         </p:nvSpPr>
         <p:spPr>
           <a:xfrm>
-            <a:off x="8640283" y="5122932"/>
+            <a:off x="8640283" y="4640332"/>
             <a:ext cx="1651819" cy="307777"/>
           </a:xfrm>
           <a:prstGeom prst="rect">
@@ -2122,7 +2122,7 @@
         </p:blipFill>
         <p:spPr>
           <a:xfrm>
-            <a:off x="9180861" y="4476210"/>
+            <a:off x="9180861" y="3993610"/>
             <a:ext cx="591034" cy="591034"/>
           </a:xfrm>
           <a:prstGeom prst="rect">
@@ -2144,7 +2144,7 @@
         </p:nvSpPr>
         <p:spPr>
           <a:xfrm>
-            <a:off x="4136101" y="5130813"/>
+            <a:off x="4136101" y="4648213"/>
             <a:ext cx="1335090" cy="461665"/>
           </a:xfrm>
           <a:prstGeom prst="rect">
@@ -2197,7 +2197,7 @@
         </p:blipFill>
         <p:spPr>
           <a:xfrm>
-            <a:off x="4539707" y="4539975"/>
+            <a:off x="4539707" y="4057375"/>
             <a:ext cx="591034" cy="591034"/>
           </a:xfrm>
           <a:prstGeom prst="rect">
@@ -2207,90 +2207,6 @@
       </p:pic>
       <p:sp>
         <p:nvSpPr>
-          <p:cNvPr id="78" name="TextBox 77">
-            <a:extLst>
-              <a:ext uri="{FF2B5EF4-FFF2-40B4-BE49-F238E27FC236}">
-                <a16:creationId xmlns:a16="http://schemas.microsoft.com/office/drawing/2014/main" id="{29576086-9C67-4847-AE71-1EF952A026D9}"/>
-              </a:ext>
-            </a:extLst>
-          </p:cNvPr>
-          <p:cNvSpPr txBox="1"/>
-          <p:nvPr/>
-        </p:nvSpPr>
-        <p:spPr>
-          <a:xfrm>
-            <a:off x="2076197" y="3341910"/>
-            <a:ext cx="1252704" cy="276999"/>
-          </a:xfrm>
-          <a:prstGeom prst="rect">
-            <a:avLst/>
-          </a:prstGeom>
-          <a:noFill/>
-        </p:spPr>
-        <p:txBody>
-          <a:bodyPr wrap="square" rtlCol="0">
-            <a:spAutoFit/>
-          </a:bodyPr>
-          <a:lstStyle/>
-          <a:p>
-            <a:pPr algn="ctr"/>
-            <a:r>
-              <a:rPr lang="en-US" sz="1200" dirty="0">
-                <a:solidFill>
-                  <a:srgbClr val="1E8900"/>
-                </a:solidFill>
-                <a:latin typeface="Arial" panose="020B0604020202020204" pitchFamily="34" charset="0"/>
-                <a:cs typeface="Arial" panose="020B0604020202020204" pitchFamily="34" charset="0"/>
-              </a:rPr>
-              <a:t>10.0.128.0/20</a:t>
-            </a:r>
-          </a:p>
-        </p:txBody>
-      </p:sp>
-      <p:sp>
-        <p:nvSpPr>
-          <p:cNvPr id="79" name="TextBox 78">
-            <a:extLst>
-              <a:ext uri="{FF2B5EF4-FFF2-40B4-BE49-F238E27FC236}">
-                <a16:creationId xmlns:a16="http://schemas.microsoft.com/office/drawing/2014/main" id="{E76ED1F6-9896-BF41-A08D-E4E02AD54952}"/>
-              </a:ext>
-            </a:extLst>
-          </p:cNvPr>
-          <p:cNvSpPr txBox="1"/>
-          <p:nvPr/>
-        </p:nvSpPr>
-        <p:spPr>
-          <a:xfrm>
-            <a:off x="2076197" y="6024908"/>
-            <a:ext cx="1252704" cy="276999"/>
-          </a:xfrm>
-          <a:prstGeom prst="rect">
-            <a:avLst/>
-          </a:prstGeom>
-          <a:noFill/>
-        </p:spPr>
-        <p:txBody>
-          <a:bodyPr wrap="square" rtlCol="0">
-            <a:spAutoFit/>
-          </a:bodyPr>
-          <a:lstStyle/>
-          <a:p>
-            <a:pPr algn="ctr"/>
-            <a:r>
-              <a:rPr lang="en-US" sz="1200" dirty="0">
-                <a:solidFill>
-                  <a:srgbClr val="007DBC"/>
-                </a:solidFill>
-                <a:latin typeface="Arial" panose="020B0604020202020204" pitchFamily="34" charset="0"/>
-                <a:cs typeface="Arial" panose="020B0604020202020204" pitchFamily="34" charset="0"/>
-              </a:rPr>
-              <a:t>10.0.0.0/19</a:t>
-            </a:r>
-          </a:p>
-        </p:txBody>
-      </p:sp>
-      <p:sp>
-        <p:nvSpPr>
           <p:cNvPr id="80" name="Rectangle 79">
             <a:extLst>
               <a:ext uri="{FF2B5EF4-FFF2-40B4-BE49-F238E27FC236}">
@@ -2303,8 +2219,8 @@
         </p:nvSpPr>
         <p:spPr>
           <a:xfrm>
-            <a:off x="5684186" y="3905698"/>
-            <a:ext cx="2470969" cy="2414536"/>
+            <a:off x="5671319" y="3659964"/>
+            <a:ext cx="2470969" cy="1424609"/>
           </a:xfrm>
           <a:prstGeom prst="rect">
             <a:avLst/>
@@ -2372,8 +2288,8 @@
         </p:nvSpPr>
         <p:spPr>
           <a:xfrm>
-            <a:off x="5517334" y="798578"/>
-            <a:ext cx="2782099" cy="5849653"/>
+            <a:off x="5517334" y="798579"/>
+            <a:ext cx="2782099" cy="4586222"/>
           </a:xfrm>
           <a:prstGeom prst="rect">
             <a:avLst/>
@@ -2489,7 +2405,7 @@
         </p:blipFill>
         <p:spPr>
           <a:xfrm>
-            <a:off x="5685910" y="3903339"/>
+            <a:off x="5673043" y="3654589"/>
             <a:ext cx="274320" cy="274320"/>
           </a:xfrm>
           <a:prstGeom prst="rect">
@@ -2600,7 +2516,7 @@
         </p:blipFill>
         <p:spPr>
           <a:xfrm>
-            <a:off x="6585447" y="4572916"/>
+            <a:off x="6585447" y="4090316"/>
             <a:ext cx="469900" cy="469900"/>
           </a:xfrm>
           <a:prstGeom prst="rect">
@@ -2622,7 +2538,7 @@
         </p:nvSpPr>
         <p:spPr>
           <a:xfrm>
-            <a:off x="6063744" y="5069549"/>
+            <a:off x="6063744" y="4586949"/>
             <a:ext cx="1513305" cy="461665"/>
           </a:xfrm>
           <a:prstGeom prst="rect">
@@ -2647,90 +2563,6 @@
           </a:p>
         </p:txBody>
       </p:sp>
-      <p:sp>
-        <p:nvSpPr>
-          <p:cNvPr id="88" name="TextBox 87">
-            <a:extLst>
-              <a:ext uri="{FF2B5EF4-FFF2-40B4-BE49-F238E27FC236}">
-                <a16:creationId xmlns:a16="http://schemas.microsoft.com/office/drawing/2014/main" id="{656BB493-A1CA-C54E-AE7E-C11ECF1B5686}"/>
-              </a:ext>
-            </a:extLst>
-          </p:cNvPr>
-          <p:cNvSpPr txBox="1"/>
-          <p:nvPr/>
-        </p:nvSpPr>
-        <p:spPr>
-          <a:xfrm>
-            <a:off x="6293318" y="3351700"/>
-            <a:ext cx="1252704" cy="276999"/>
-          </a:xfrm>
-          <a:prstGeom prst="rect">
-            <a:avLst/>
-          </a:prstGeom>
-          <a:noFill/>
-        </p:spPr>
-        <p:txBody>
-          <a:bodyPr wrap="square" rtlCol="0">
-            <a:spAutoFit/>
-          </a:bodyPr>
-          <a:lstStyle/>
-          <a:p>
-            <a:pPr algn="ctr"/>
-            <a:r>
-              <a:rPr lang="en-US" sz="1200" dirty="0">
-                <a:solidFill>
-                  <a:srgbClr val="1E8900"/>
-                </a:solidFill>
-                <a:latin typeface="Arial" panose="020B0604020202020204" pitchFamily="34" charset="0"/>
-                <a:cs typeface="Arial" panose="020B0604020202020204" pitchFamily="34" charset="0"/>
-              </a:rPr>
-              <a:t>10.0.144.0/20</a:t>
-            </a:r>
-          </a:p>
-        </p:txBody>
-      </p:sp>
-      <p:sp>
-        <p:nvSpPr>
-          <p:cNvPr id="89" name="TextBox 88">
-            <a:extLst>
-              <a:ext uri="{FF2B5EF4-FFF2-40B4-BE49-F238E27FC236}">
-                <a16:creationId xmlns:a16="http://schemas.microsoft.com/office/drawing/2014/main" id="{178435E2-2F21-354F-A615-8B8B91FE7564}"/>
-              </a:ext>
-            </a:extLst>
-          </p:cNvPr>
-          <p:cNvSpPr txBox="1"/>
-          <p:nvPr/>
-        </p:nvSpPr>
-        <p:spPr>
-          <a:xfrm>
-            <a:off x="6293318" y="6034698"/>
-            <a:ext cx="1252704" cy="276999"/>
-          </a:xfrm>
-          <a:prstGeom prst="rect">
-            <a:avLst/>
-          </a:prstGeom>
-          <a:noFill/>
-        </p:spPr>
-        <p:txBody>
-          <a:bodyPr wrap="square" rtlCol="0">
-            <a:spAutoFit/>
-          </a:bodyPr>
-          <a:lstStyle/>
-          <a:p>
-            <a:pPr algn="ctr"/>
-            <a:r>
-              <a:rPr lang="en-US" sz="1200" dirty="0">
-                <a:solidFill>
-                  <a:srgbClr val="007DBC"/>
-                </a:solidFill>
-                <a:latin typeface="Arial" panose="020B0604020202020204" pitchFamily="34" charset="0"/>
-                <a:cs typeface="Arial" panose="020B0604020202020204" pitchFamily="34" charset="0"/>
-              </a:rPr>
-              <a:t>10.0.32.0/19</a:t>
-            </a:r>
-          </a:p>
-        </p:txBody>
-      </p:sp>
       <p:cxnSp>
         <p:nvCxnSpPr>
           <p:cNvPr id="90" name="Straight Arrow Connector 89">
@@ -2748,7 +2580,7 @@
         </p:nvCxnSpPr>
         <p:spPr>
           <a:xfrm>
-            <a:off x="5130741" y="4835492"/>
+            <a:off x="5130741" y="4352892"/>
             <a:ext cx="1356004" cy="0"/>
           </a:xfrm>
           <a:prstGeom prst="straightConnector1">
@@ -2794,7 +2626,7 @@
         </p:nvCxnSpPr>
         <p:spPr>
           <a:xfrm flipV="1">
-            <a:off x="3202660" y="4835492"/>
+            <a:off x="3202660" y="4352892"/>
             <a:ext cx="1337047" cy="0"/>
           </a:xfrm>
           <a:prstGeom prst="straightConnector1">
@@ -2823,48 +2655,6 @@
           </a:fontRef>
         </p:style>
       </p:cxnSp>
-      <p:sp>
-        <p:nvSpPr>
-          <p:cNvPr id="92" name="TextBox 91">
-            <a:extLst>
-              <a:ext uri="{FF2B5EF4-FFF2-40B4-BE49-F238E27FC236}">
-                <a16:creationId xmlns:a16="http://schemas.microsoft.com/office/drawing/2014/main" id="{2F99FBBF-A24C-0B47-BB8B-62BCCB84B0C5}"/>
-              </a:ext>
-            </a:extLst>
-          </p:cNvPr>
-          <p:cNvSpPr txBox="1"/>
-          <p:nvPr/>
-        </p:nvSpPr>
-        <p:spPr>
-          <a:xfrm>
-            <a:off x="4094885" y="6186299"/>
-            <a:ext cx="1435022" cy="276999"/>
-          </a:xfrm>
-          <a:prstGeom prst="rect">
-            <a:avLst/>
-          </a:prstGeom>
-          <a:noFill/>
-        </p:spPr>
-        <p:txBody>
-          <a:bodyPr wrap="square" rtlCol="0">
-            <a:spAutoFit/>
-          </a:bodyPr>
-          <a:lstStyle/>
-          <a:p>
-            <a:pPr algn="ctr"/>
-            <a:r>
-              <a:rPr lang="en-US" sz="1200" dirty="0">
-                <a:solidFill>
-                  <a:srgbClr val="1E8900"/>
-                </a:solidFill>
-                <a:latin typeface="Arial" panose="020B0604020202020204" pitchFamily="34" charset="0"/>
-                <a:cs typeface="Arial" panose="020B0604020202020204" pitchFamily="34" charset="0"/>
-              </a:rPr>
-              <a:t>10.0.0.0/16</a:t>
-            </a:r>
-          </a:p>
-        </p:txBody>
-      </p:sp>
       <p:sp>
         <p:nvSpPr>
           <p:cNvPr id="93" name="Rectangle 92">
@@ -2966,7 +2756,7 @@
         </p:nvSpPr>
         <p:spPr>
           <a:xfrm>
-            <a:off x="9311797" y="412799"/>
+            <a:off x="9311797" y="120699"/>
             <a:ext cx="2750358" cy="2585323"/>
           </a:xfrm>
           <a:prstGeom prst="rect">

</xml_diff>